<commit_message>
Updated PPT and DOCX files for AI Mini Project
</commit_message>
<xml_diff>
--- a/hariprasath_AI_PPT.pptx
+++ b/hariprasath_AI_PPT.pptx
@@ -37,6 +37,43 @@
     </p:ext>
   </p:extLst>
 </p:presentation>
+</file>
+
+<file path=ppt/revisionInfo.xml><?xml version="1.0" encoding="utf-8"?>
+<p1510:revInfo xmlns:a="http://schemas.openxmlformats.org/drawingml/2006/main" xmlns:r="http://schemas.openxmlformats.org/officeDocument/2006/relationships" xmlns:p1510="http://schemas.microsoft.com/office/powerpoint/2015/10/main">
+  <p1510:revLst>
+    <p1510:client id="{FF2095AE-F299-4ACD-9201-5A3C334D57E7}" v="3" dt="2025-11-02T17:59:54.623"/>
+  </p1510:revLst>
+</p1510:revInfo>
+</file>
+
+<file path=ppt/changesInfos/changesInfo1.xml><?xml version="1.0" encoding="utf-8"?>
+<pc:chgInfo xmlns:a="http://schemas.openxmlformats.org/drawingml/2006/main" xmlns:r="http://schemas.openxmlformats.org/officeDocument/2006/relationships" xmlns:ac="http://schemas.microsoft.com/office/drawing/2013/main/command" xmlns:pc="http://schemas.microsoft.com/office/powerpoint/2013/main/command">
+  <pc:docChgLst>
+    <pc:chgData name="hariprasathmohan729@outlook.com" userId="6b7029db9b1b7420" providerId="LiveId" clId="{738EFB5A-C38F-450C-A396-AC467F5FF20F}"/>
+    <pc:docChg chg="modSld">
+      <pc:chgData name="hariprasathmohan729@outlook.com" userId="6b7029db9b1b7420" providerId="LiveId" clId="{738EFB5A-C38F-450C-A396-AC467F5FF20F}" dt="2025-11-02T17:59:54.623" v="2"/>
+      <pc:docMkLst>
+        <pc:docMk/>
+      </pc:docMkLst>
+      <pc:sldChg chg="modSp">
+        <pc:chgData name="hariprasathmohan729@outlook.com" userId="6b7029db9b1b7420" providerId="LiveId" clId="{738EFB5A-C38F-450C-A396-AC467F5FF20F}" dt="2025-11-02T17:59:54.623" v="2"/>
+        <pc:sldMkLst>
+          <pc:docMk/>
+          <pc:sldMk cId="0" sldId="259"/>
+        </pc:sldMkLst>
+        <pc:graphicFrameChg chg="mod">
+          <ac:chgData name="hariprasathmohan729@outlook.com" userId="6b7029db9b1b7420" providerId="LiveId" clId="{738EFB5A-C38F-450C-A396-AC467F5FF20F}" dt="2025-11-02T17:59:54.623" v="2"/>
+          <ac:graphicFrameMkLst>
+            <pc:docMk/>
+            <pc:sldMk cId="0" sldId="259"/>
+            <ac:graphicFrameMk id="7" creationId="{00000000-0000-0000-0000-000000000000}"/>
+          </ac:graphicFrameMkLst>
+        </pc:graphicFrameChg>
+      </pc:sldChg>
+    </pc:docChg>
+  </pc:docChgLst>
+</pc:chgInfo>
 </file>
 
 <file path=ppt/slideLayouts/slideLayout1.xml><?xml version="1.0" encoding="utf-8"?>
@@ -5549,14 +5586,14 @@
           <p:nvPr>
             <p:extLst>
               <p:ext uri="{D42A27DB-BD31-4B8C-83A1-F6EECF244321}">
-                <p14:modId xmlns:p14="http://schemas.microsoft.com/office/powerpoint/2010/main" val="3614729659"/>
+                <p14:modId xmlns:p14="http://schemas.microsoft.com/office/powerpoint/2010/main" val="534041839"/>
               </p:ext>
             </p:extLst>
           </p:nvPr>
         </p:nvGraphicFramePr>
         <p:xfrm>
           <a:off x="1847850" y="2198877"/>
-          <a:ext cx="8128000" cy="2834005"/>
+          <a:ext cx="8128000" cy="3322320"/>
         </p:xfrm>
         <a:graphic>
           <a:graphicData uri="http://schemas.openxmlformats.org/drawingml/2006/table">
@@ -5837,6 +5874,18 @@
                           <a:spcPts val="245"/>
                         </a:spcBef>
                       </a:pPr>
+                      <a:r>
+                        <a:rPr lang="en-IN" dirty="0">
+                          <a:hlinkClick r:id="rId4"/>
+                        </a:rPr>
+                        <a:t>hariprasath729/AI-</a:t>
+                      </a:r>
+                      <a:r>
+                        <a:rPr lang="en-IN" dirty="0" err="1">
+                          <a:hlinkClick r:id="rId4"/>
+                        </a:rPr>
+                        <a:t>Miniproject</a:t>
+                      </a:r>
                       <a:endParaRPr sz="1800" dirty="0">
                         <a:latin typeface="Calibri"/>
                         <a:cs typeface="Calibri"/>
@@ -5985,6 +6034,30 @@
                           <a:spcPts val="245"/>
                         </a:spcBef>
                       </a:pPr>
+                      <a:r>
+                        <a:rPr lang="en-IN" dirty="0">
+                          <a:hlinkClick r:id="rId5"/>
+                        </a:rPr>
+                        <a:t>AI-</a:t>
+                      </a:r>
+                      <a:r>
+                        <a:rPr lang="en-IN" dirty="0" err="1">
+                          <a:hlinkClick r:id="rId5"/>
+                        </a:rPr>
+                        <a:t>Miniproject</a:t>
+                      </a:r>
+                      <a:r>
+                        <a:rPr lang="en-IN" dirty="0">
+                          <a:hlinkClick r:id="rId5"/>
+                        </a:rPr>
+                        <a:t>/hariprasath_AI_MINIE_PROJECTS.docx at main · hariprasath729/AI-</a:t>
+                      </a:r>
+                      <a:r>
+                        <a:rPr lang="en-IN" dirty="0" err="1">
+                          <a:hlinkClick r:id="rId5"/>
+                        </a:rPr>
+                        <a:t>Miniproject</a:t>
+                      </a:r>
                       <a:endParaRPr sz="1800" dirty="0">
                         <a:latin typeface="Calibri"/>
                         <a:cs typeface="Calibri"/>
@@ -6098,6 +6171,30 @@
                           <a:spcPts val="245"/>
                         </a:spcBef>
                       </a:pPr>
+                      <a:r>
+                        <a:rPr lang="en-IN" dirty="0">
+                          <a:hlinkClick r:id="rId6"/>
+                        </a:rPr>
+                        <a:t>AI-</a:t>
+                      </a:r>
+                      <a:r>
+                        <a:rPr lang="en-IN" dirty="0" err="1">
+                          <a:hlinkClick r:id="rId6"/>
+                        </a:rPr>
+                        <a:t>Miniproject</a:t>
+                      </a:r>
+                      <a:r>
+                        <a:rPr lang="en-IN" dirty="0">
+                          <a:hlinkClick r:id="rId6"/>
+                        </a:rPr>
+                        <a:t>/hariprasath_AI_PPT.pptx at main · hariprasath729/AI-</a:t>
+                      </a:r>
+                      <a:r>
+                        <a:rPr lang="en-IN">
+                          <a:hlinkClick r:id="rId6"/>
+                        </a:rPr>
+                        <a:t>Miniproject</a:t>
+                      </a:r>
                       <a:endParaRPr sz="1800" dirty="0">
                         <a:latin typeface="Calibri"/>
                         <a:cs typeface="Calibri"/>

</xml_diff>